<commit_message>
minor changes to the slides
</commit_message>
<xml_diff>
--- a/slides/qiskit hands-on.pptx
+++ b/slides/qiskit hands-on.pptx
@@ -262,7 +262,7 @@
   </p:defaultTextStyle>
   <p:extLst>
     <p:ext uri="{EFAFB233-063F-42B5-8137-9DF3F51BA10A}">
-      <p15:sldGuideLst xmlns="" xmlns:p15="http://schemas.microsoft.com/office/powerpoint/2012/main">
+      <p15:sldGuideLst xmlns:p15="http://schemas.microsoft.com/office/powerpoint/2012/main" xmlns="">
         <p15:guide id="1" orient="horz" pos="1620">
           <p15:clr>
             <a:srgbClr val="A4A3A4"/>
@@ -830,6 +830,214 @@
 </file>
 
 <file path=ppt/notesSlides/notesSlide10.xml><?xml version="1.0" encoding="utf-8"?>
+<p:notes xmlns:a="http://schemas.openxmlformats.org/drawingml/2006/main" xmlns:r="http://schemas.openxmlformats.org/officeDocument/2006/relationships" xmlns:p="http://schemas.openxmlformats.org/presentationml/2006/main" showMasterSp="0" showMasterPhAnim="0">
+  <p:cSld>
+    <p:spTree>
+      <p:nvGrpSpPr>
+        <p:cNvPr id="1" name="Shape 204"/>
+        <p:cNvGrpSpPr/>
+        <p:nvPr/>
+      </p:nvGrpSpPr>
+      <p:grpSpPr>
+        <a:xfrm>
+          <a:off x="0" y="0"/>
+          <a:ext cx="0" cy="0"/>
+          <a:chOff x="0" y="0"/>
+          <a:chExt cx="0" cy="0"/>
+        </a:xfrm>
+      </p:grpSpPr>
+      <p:sp>
+        <p:nvSpPr>
+          <p:cNvPr id="205" name="Google Shape;205;g6d3edeccc4_1_86:notes"/>
+          <p:cNvSpPr>
+            <a:spLocks noGrp="1" noRot="1" noChangeAspect="1"/>
+          </p:cNvSpPr>
+          <p:nvPr>
+            <p:ph type="sldImg" idx="2"/>
+          </p:nvPr>
+        </p:nvSpPr>
+        <p:spPr>
+          <a:xfrm>
+            <a:off x="381000" y="685800"/>
+            <a:ext cx="6096000" cy="3429000"/>
+          </a:xfrm>
+          <a:custGeom>
+            <a:avLst/>
+            <a:gdLst/>
+            <a:ahLst/>
+            <a:cxnLst/>
+            <a:rect l="l" t="t" r="r" b="b"/>
+            <a:pathLst>
+              <a:path w="120000" h="120000" extrusionOk="0">
+                <a:moveTo>
+                  <a:pt x="0" y="0"/>
+                </a:moveTo>
+                <a:lnTo>
+                  <a:pt x="120000" y="0"/>
+                </a:lnTo>
+                <a:lnTo>
+                  <a:pt x="120000" y="120000"/>
+                </a:lnTo>
+                <a:lnTo>
+                  <a:pt x="0" y="120000"/>
+                </a:lnTo>
+                <a:close/>
+              </a:path>
+            </a:pathLst>
+          </a:custGeom>
+        </p:spPr>
+      </p:sp>
+      <p:sp>
+        <p:nvSpPr>
+          <p:cNvPr id="206" name="Google Shape;206;g6d3edeccc4_1_86:notes"/>
+          <p:cNvSpPr txBox="1">
+            <a:spLocks noGrp="1"/>
+          </p:cNvSpPr>
+          <p:nvPr>
+            <p:ph type="body" idx="1"/>
+          </p:nvPr>
+        </p:nvSpPr>
+        <p:spPr>
+          <a:xfrm>
+            <a:off x="685800" y="4343400"/>
+            <a:ext cx="5486400" cy="4114800"/>
+          </a:xfrm>
+          <a:prstGeom prst="rect">
+            <a:avLst/>
+          </a:prstGeom>
+        </p:spPr>
+        <p:txBody>
+          <a:bodyPr spcFirstLastPara="1" wrap="square" lIns="91425" tIns="91425" rIns="91425" bIns="91425" anchor="t" anchorCtr="0">
+            <a:noAutofit/>
+          </a:bodyPr>
+          <a:lstStyle/>
+          <a:p>
+            <a:pPr marL="0" lvl="0" indent="0" algn="l" rtl="0">
+              <a:spcBef>
+                <a:spcPts val="0"/>
+              </a:spcBef>
+              <a:spcAft>
+                <a:spcPts val="0"/>
+              </a:spcAft>
+              <a:buNone/>
+            </a:pPr>
+            <a:endParaRPr/>
+          </a:p>
+        </p:txBody>
+      </p:sp>
+    </p:spTree>
+  </p:cSld>
+  <p:clrMapOvr>
+    <a:masterClrMapping/>
+  </p:clrMapOvr>
+</p:notes>
+</file>
+
+<file path=ppt/notesSlides/notesSlide11.xml><?xml version="1.0" encoding="utf-8"?>
+<p:notes xmlns:a="http://schemas.openxmlformats.org/drawingml/2006/main" xmlns:r="http://schemas.openxmlformats.org/officeDocument/2006/relationships" xmlns:p="http://schemas.openxmlformats.org/presentationml/2006/main" showMasterSp="0" showMasterPhAnim="0">
+  <p:cSld>
+    <p:spTree>
+      <p:nvGrpSpPr>
+        <p:cNvPr id="1" name="Shape 213"/>
+        <p:cNvGrpSpPr/>
+        <p:nvPr/>
+      </p:nvGrpSpPr>
+      <p:grpSpPr>
+        <a:xfrm>
+          <a:off x="0" y="0"/>
+          <a:ext cx="0" cy="0"/>
+          <a:chOff x="0" y="0"/>
+          <a:chExt cx="0" cy="0"/>
+        </a:xfrm>
+      </p:grpSpPr>
+      <p:sp>
+        <p:nvSpPr>
+          <p:cNvPr id="214" name="Google Shape;214;g76631abf04_0_0:notes"/>
+          <p:cNvSpPr>
+            <a:spLocks noGrp="1" noRot="1" noChangeAspect="1"/>
+          </p:cNvSpPr>
+          <p:nvPr>
+            <p:ph type="sldImg" idx="2"/>
+          </p:nvPr>
+        </p:nvSpPr>
+        <p:spPr>
+          <a:xfrm>
+            <a:off x="381000" y="685800"/>
+            <a:ext cx="6096000" cy="3429000"/>
+          </a:xfrm>
+          <a:custGeom>
+            <a:avLst/>
+            <a:gdLst/>
+            <a:ahLst/>
+            <a:cxnLst/>
+            <a:rect l="l" t="t" r="r" b="b"/>
+            <a:pathLst>
+              <a:path w="120000" h="120000" extrusionOk="0">
+                <a:moveTo>
+                  <a:pt x="0" y="0"/>
+                </a:moveTo>
+                <a:lnTo>
+                  <a:pt x="120000" y="0"/>
+                </a:lnTo>
+                <a:lnTo>
+                  <a:pt x="120000" y="120000"/>
+                </a:lnTo>
+                <a:lnTo>
+                  <a:pt x="0" y="120000"/>
+                </a:lnTo>
+                <a:close/>
+              </a:path>
+            </a:pathLst>
+          </a:custGeom>
+        </p:spPr>
+      </p:sp>
+      <p:sp>
+        <p:nvSpPr>
+          <p:cNvPr id="215" name="Google Shape;215;g76631abf04_0_0:notes"/>
+          <p:cNvSpPr txBox="1">
+            <a:spLocks noGrp="1"/>
+          </p:cNvSpPr>
+          <p:nvPr>
+            <p:ph type="body" idx="1"/>
+          </p:nvPr>
+        </p:nvSpPr>
+        <p:spPr>
+          <a:xfrm>
+            <a:off x="685800" y="4343400"/>
+            <a:ext cx="5486400" cy="4114800"/>
+          </a:xfrm>
+          <a:prstGeom prst="rect">
+            <a:avLst/>
+          </a:prstGeom>
+        </p:spPr>
+        <p:txBody>
+          <a:bodyPr spcFirstLastPara="1" wrap="square" lIns="91425" tIns="91425" rIns="91425" bIns="91425" anchor="t" anchorCtr="0">
+            <a:noAutofit/>
+          </a:bodyPr>
+          <a:lstStyle/>
+          <a:p>
+            <a:pPr marL="0" lvl="0" indent="0" algn="l" rtl="0">
+              <a:spcBef>
+                <a:spcPts val="0"/>
+              </a:spcBef>
+              <a:spcAft>
+                <a:spcPts val="0"/>
+              </a:spcAft>
+              <a:buNone/>
+            </a:pPr>
+            <a:endParaRPr/>
+          </a:p>
+        </p:txBody>
+      </p:sp>
+    </p:spTree>
+  </p:cSld>
+  <p:clrMapOvr>
+    <a:masterClrMapping/>
+  </p:clrMapOvr>
+</p:notes>
+</file>
+
+<file path=ppt/notesSlides/notesSlide12.xml><?xml version="1.0" encoding="utf-8"?>
 <p:notes xmlns:a="http://schemas.openxmlformats.org/drawingml/2006/main" xmlns:r="http://schemas.openxmlformats.org/officeDocument/2006/relationships" xmlns:p="http://schemas.openxmlformats.org/presentationml/2006/main">
   <p:cSld>
     <p:spTree>
@@ -920,7 +1128,7 @@
 </p:notes>
 </file>
 
-<file path=ppt/notesSlides/notesSlide11.xml><?xml version="1.0" encoding="utf-8"?>
+<file path=ppt/notesSlides/notesSlide13.xml><?xml version="1.0" encoding="utf-8"?>
 <p:notes xmlns:a="http://schemas.openxmlformats.org/drawingml/2006/main" xmlns:r="http://schemas.openxmlformats.org/officeDocument/2006/relationships" xmlns:p="http://schemas.openxmlformats.org/presentationml/2006/main" showMasterSp="0" showMasterPhAnim="0">
   <p:cSld>
     <p:spTree>
@@ -1040,7 +1248,7 @@
 </p:notes>
 </file>
 
-<file path=ppt/notesSlides/notesSlide12.xml><?xml version="1.0" encoding="utf-8"?>
+<file path=ppt/notesSlides/notesSlide14.xml><?xml version="1.0" encoding="utf-8"?>
 <p:notes xmlns:a="http://schemas.openxmlformats.org/drawingml/2006/main" xmlns:r="http://schemas.openxmlformats.org/officeDocument/2006/relationships" xmlns:p="http://schemas.openxmlformats.org/presentationml/2006/main" showMasterSp="0" showMasterPhAnim="0">
   <p:cSld>
     <p:spTree>
@@ -1144,7 +1352,7 @@
 </p:notes>
 </file>
 
-<file path=ppt/notesSlides/notesSlide13.xml><?xml version="1.0" encoding="utf-8"?>
+<file path=ppt/notesSlides/notesSlide15.xml><?xml version="1.0" encoding="utf-8"?>
 <p:notes xmlns:a="http://schemas.openxmlformats.org/drawingml/2006/main" xmlns:r="http://schemas.openxmlformats.org/officeDocument/2006/relationships" xmlns:p="http://schemas.openxmlformats.org/presentationml/2006/main" showMasterSp="0" showMasterPhAnim="0">
   <p:cSld>
     <p:spTree>
@@ -1248,7 +1456,7 @@
 </p:notes>
 </file>
 
-<file path=ppt/notesSlides/notesSlide14.xml><?xml version="1.0" encoding="utf-8"?>
+<file path=ppt/notesSlides/notesSlide16.xml><?xml version="1.0" encoding="utf-8"?>
 <p:notes xmlns:a="http://schemas.openxmlformats.org/drawingml/2006/main" xmlns:r="http://schemas.openxmlformats.org/officeDocument/2006/relationships" xmlns:p="http://schemas.openxmlformats.org/presentationml/2006/main" showMasterSp="0" showMasterPhAnim="0">
   <p:cSld>
     <p:spTree>
@@ -1352,7 +1560,7 @@
 </p:notes>
 </file>
 
-<file path=ppt/notesSlides/notesSlide15.xml><?xml version="1.0" encoding="utf-8"?>
+<file path=ppt/notesSlides/notesSlide17.xml><?xml version="1.0" encoding="utf-8"?>
 <p:notes xmlns:a="http://schemas.openxmlformats.org/drawingml/2006/main" xmlns:r="http://schemas.openxmlformats.org/officeDocument/2006/relationships" xmlns:p="http://schemas.openxmlformats.org/presentationml/2006/main" showMasterSp="0" showMasterPhAnim="0">
   <p:cSld>
     <p:spTree>
@@ -1456,7 +1664,7 @@
 </p:notes>
 </file>
 
-<file path=ppt/notesSlides/notesSlide16.xml><?xml version="1.0" encoding="utf-8"?>
+<file path=ppt/notesSlides/notesSlide18.xml><?xml version="1.0" encoding="utf-8"?>
 <p:notes xmlns:a="http://schemas.openxmlformats.org/drawingml/2006/main" xmlns:r="http://schemas.openxmlformats.org/officeDocument/2006/relationships" xmlns:p="http://schemas.openxmlformats.org/presentationml/2006/main" showMasterSp="0" showMasterPhAnim="0">
   <p:cSld>
     <p:spTree>
@@ -1560,7 +1768,7 @@
 </p:notes>
 </file>
 
-<file path=ppt/notesSlides/notesSlide17.xml><?xml version="1.0" encoding="utf-8"?>
+<file path=ppt/notesSlides/notesSlide19.xml><?xml version="1.0" encoding="utf-8"?>
 <p:notes xmlns:a="http://schemas.openxmlformats.org/drawingml/2006/main" xmlns:r="http://schemas.openxmlformats.org/officeDocument/2006/relationships" xmlns:p="http://schemas.openxmlformats.org/presentationml/2006/main" showMasterSp="0" showMasterPhAnim="0">
   <p:cSld>
     <p:spTree>
@@ -1865,7 +2073,75 @@
               </a:spcAft>
               <a:buNone/>
             </a:pPr>
-            <a:endParaRPr/>
+            <a:r>
+              <a:rPr lang="es-ES_tradnl" dirty="0" smtClean="0"/>
+              <a:t>Computaci</a:t>
+            </a:r>
+            <a:r>
+              <a:rPr lang="es-ES_tradnl" dirty="0" smtClean="0"/>
+              <a:t>ón clásica versus computación cuántica</a:t>
+            </a:r>
+          </a:p>
+          <a:p>
+            <a:pPr marL="171450" lvl="0" indent="-171450" algn="l" rtl="0">
+              <a:spcBef>
+                <a:spcPts val="0"/>
+              </a:spcBef>
+              <a:spcAft>
+                <a:spcPts val="0"/>
+              </a:spcAft>
+              <a:buFontTx/>
+              <a:buChar char="-"/>
+            </a:pPr>
+            <a:r>
+              <a:rPr lang="es-ES_tradnl" dirty="0" smtClean="0"/>
+              <a:t>En la</a:t>
+            </a:r>
+            <a:r>
+              <a:rPr lang="es-ES_tradnl" baseline="0" dirty="0" smtClean="0"/>
+              <a:t> computación clásica, la unidad mínima de información es el bit (</a:t>
+            </a:r>
+            <a:r>
+              <a:rPr lang="es-ES_tradnl" baseline="0" dirty="0" err="1" smtClean="0"/>
+              <a:t>binary</a:t>
+            </a:r>
+            <a:r>
+              <a:rPr lang="es-ES_tradnl" baseline="0" dirty="0" smtClean="0"/>
+              <a:t> </a:t>
+            </a:r>
+            <a:r>
+              <a:rPr lang="es-ES_tradnl" baseline="0" dirty="0" err="1" smtClean="0"/>
+              <a:t>digit</a:t>
+            </a:r>
+            <a:r>
+              <a:rPr lang="es-ES_tradnl" baseline="0" dirty="0" smtClean="0"/>
+              <a:t>) que puede tomar el valor de 0 o 1.</a:t>
+            </a:r>
+          </a:p>
+          <a:p>
+            <a:pPr marL="171450" lvl="0" indent="-171450" algn="l" rtl="0">
+              <a:spcBef>
+                <a:spcPts val="0"/>
+              </a:spcBef>
+              <a:spcAft>
+                <a:spcPts val="0"/>
+              </a:spcAft>
+              <a:buFontTx/>
+              <a:buChar char="-"/>
+            </a:pPr>
+            <a:r>
+              <a:rPr lang="es-ES_tradnl" baseline="0" dirty="0" smtClean="0"/>
+              <a:t>En la computación cuántica, la unidad mínima de información es el </a:t>
+            </a:r>
+            <a:r>
+              <a:rPr lang="es-ES_tradnl" baseline="0" dirty="0" err="1" smtClean="0"/>
+              <a:t>qubit</a:t>
+            </a:r>
+            <a:r>
+              <a:rPr lang="es-ES_tradnl" baseline="0" dirty="0" smtClean="0"/>
+              <a:t>, que puede tomar el valor de 0 o 1 o una superposición cuántica de 0 y 1 </a:t>
+            </a:r>
+            <a:endParaRPr dirty="0"/>
           </a:p>
         </p:txBody>
       </p:sp>
@@ -1878,6 +2154,292 @@
 </file>
 
 <file path=ppt/notesSlides/notesSlide4.xml><?xml version="1.0" encoding="utf-8"?>
+<p:notes xmlns:a="http://schemas.openxmlformats.org/drawingml/2006/main" xmlns:r="http://schemas.openxmlformats.org/officeDocument/2006/relationships" xmlns:p="http://schemas.openxmlformats.org/presentationml/2006/main">
+  <p:cSld>
+    <p:spTree>
+      <p:nvGrpSpPr>
+        <p:cNvPr id="1" name=""/>
+        <p:cNvGrpSpPr/>
+        <p:nvPr/>
+      </p:nvGrpSpPr>
+      <p:grpSpPr>
+        <a:xfrm>
+          <a:off x="0" y="0"/>
+          <a:ext cx="0" cy="0"/>
+          <a:chOff x="0" y="0"/>
+          <a:chExt cx="0" cy="0"/>
+        </a:xfrm>
+      </p:grpSpPr>
+      <p:sp>
+        <p:nvSpPr>
+          <p:cNvPr id="2" name="Marcador de imagen de diapositiva 1"/>
+          <p:cNvSpPr>
+            <a:spLocks noGrp="1" noRot="1" noChangeAspect="1"/>
+          </p:cNvSpPr>
+          <p:nvPr>
+            <p:ph type="sldImg"/>
+          </p:nvPr>
+        </p:nvSpPr>
+        <p:spPr/>
+      </p:sp>
+      <p:sp>
+        <p:nvSpPr>
+          <p:cNvPr id="3" name="Marcador de notas 2"/>
+          <p:cNvSpPr>
+            <a:spLocks noGrp="1"/>
+          </p:cNvSpPr>
+          <p:nvPr>
+            <p:ph type="body" idx="1"/>
+          </p:nvPr>
+        </p:nvSpPr>
+        <p:spPr/>
+        <p:txBody>
+          <a:bodyPr/>
+          <a:lstStyle/>
+          <a:p>
+            <a:pPr marL="158750" marR="0" indent="0" algn="l" defTabSz="914400" rtl="0" eaLnBrk="1" fontAlgn="auto" latinLnBrk="0" hangingPunct="1">
+              <a:lnSpc>
+                <a:spcPct val="100000"/>
+              </a:lnSpc>
+              <a:spcBef>
+                <a:spcPts val="0"/>
+              </a:spcBef>
+              <a:spcAft>
+                <a:spcPts val="0"/>
+              </a:spcAft>
+              <a:buClr>
+                <a:srgbClr val="000000"/>
+              </a:buClr>
+              <a:buSzPts val="1100"/>
+              <a:buFont typeface="Arial"/>
+              <a:buNone/>
+              <a:tabLst/>
+              <a:defRPr/>
+            </a:pPr>
+            <a:r>
+              <a:rPr lang="es-ES" dirty="0" smtClean="0"/>
+              <a:t>En mecánica cuántica, la esfera de </a:t>
+            </a:r>
+            <a:r>
+              <a:rPr lang="es-ES" dirty="0" err="1" smtClean="0"/>
+              <a:t>Bloch</a:t>
+            </a:r>
+            <a:r>
+              <a:rPr lang="es-ES" dirty="0" smtClean="0"/>
+              <a:t> es una representación geométrica del espacio de estados puros de un sistema cuántico de dos niveles.</a:t>
+            </a:r>
+          </a:p>
+          <a:p>
+            <a:pPr marL="158750" marR="0" indent="0" algn="l" defTabSz="914400" rtl="0" eaLnBrk="1" fontAlgn="auto" latinLnBrk="0" hangingPunct="1">
+              <a:lnSpc>
+                <a:spcPct val="100000"/>
+              </a:lnSpc>
+              <a:spcBef>
+                <a:spcPts val="0"/>
+              </a:spcBef>
+              <a:spcAft>
+                <a:spcPts val="0"/>
+              </a:spcAft>
+              <a:buClr>
+                <a:srgbClr val="000000"/>
+              </a:buClr>
+              <a:buSzPts val="1100"/>
+              <a:buFont typeface="Arial"/>
+              <a:buNone/>
+              <a:tabLst/>
+              <a:defRPr/>
+            </a:pPr>
+            <a:endParaRPr lang="es-ES" dirty="0" smtClean="0"/>
+          </a:p>
+          <a:p>
+            <a:pPr marL="158750" marR="0" indent="0" algn="l" defTabSz="914400" rtl="0" eaLnBrk="1" fontAlgn="auto" latinLnBrk="0" hangingPunct="1">
+              <a:lnSpc>
+                <a:spcPct val="100000"/>
+              </a:lnSpc>
+              <a:spcBef>
+                <a:spcPts val="0"/>
+              </a:spcBef>
+              <a:spcAft>
+                <a:spcPts val="0"/>
+              </a:spcAft>
+              <a:buClr>
+                <a:srgbClr val="000000"/>
+              </a:buClr>
+              <a:buSzPts val="1100"/>
+              <a:buFont typeface="Arial"/>
+              <a:buNone/>
+              <a:tabLst/>
+              <a:defRPr/>
+            </a:pPr>
+            <a:r>
+              <a:rPr lang="es-ES" dirty="0" smtClean="0"/>
+              <a:t>Un</a:t>
+            </a:r>
+            <a:r>
+              <a:rPr lang="es-ES" baseline="0" dirty="0" smtClean="0"/>
+              <a:t> </a:t>
+            </a:r>
+            <a:r>
+              <a:rPr lang="es-ES" baseline="0" dirty="0" err="1" smtClean="0"/>
+              <a:t>qubit</a:t>
+            </a:r>
+            <a:r>
+              <a:rPr lang="es-ES" baseline="0" dirty="0" smtClean="0"/>
+              <a:t> se puede representar como una combinaci</a:t>
+            </a:r>
+            <a:r>
+              <a:rPr lang="es-ES" baseline="0" dirty="0" smtClean="0"/>
+              <a:t>ón lineal de los estados |0&gt; y |1&gt;  … es decir |</a:t>
+            </a:r>
+            <a:r>
+              <a:rPr lang="es-ES" baseline="0" dirty="0" err="1" smtClean="0"/>
+              <a:t>Ψ</a:t>
+            </a:r>
+            <a:r>
+              <a:rPr lang="es-ES" baseline="0" dirty="0" smtClean="0"/>
+              <a:t>&gt; = α |0&gt; + β |1&gt; </a:t>
+            </a:r>
+            <a:endParaRPr lang="es-ES" dirty="0" smtClean="0"/>
+          </a:p>
+          <a:p>
+            <a:pPr marL="158750" marR="0" indent="0" algn="l" defTabSz="914400" rtl="0" eaLnBrk="1" fontAlgn="auto" latinLnBrk="0" hangingPunct="1">
+              <a:lnSpc>
+                <a:spcPct val="100000"/>
+              </a:lnSpc>
+              <a:spcBef>
+                <a:spcPts val="0"/>
+              </a:spcBef>
+              <a:spcAft>
+                <a:spcPts val="0"/>
+              </a:spcAft>
+              <a:buClr>
+                <a:srgbClr val="000000"/>
+              </a:buClr>
+              <a:buSzPts val="1100"/>
+              <a:buFont typeface="Arial"/>
+              <a:buNone/>
+              <a:tabLst/>
+              <a:defRPr/>
+            </a:pPr>
+            <a:endParaRPr lang="es-ES" dirty="0" smtClean="0"/>
+          </a:p>
+          <a:p>
+            <a:pPr marL="158750" marR="0" indent="0" algn="l" defTabSz="914400" rtl="0" eaLnBrk="1" fontAlgn="auto" latinLnBrk="0" hangingPunct="1">
+              <a:lnSpc>
+                <a:spcPct val="100000"/>
+              </a:lnSpc>
+              <a:spcBef>
+                <a:spcPts val="0"/>
+              </a:spcBef>
+              <a:spcAft>
+                <a:spcPts val="0"/>
+              </a:spcAft>
+              <a:buClr>
+                <a:srgbClr val="000000"/>
+              </a:buClr>
+              <a:buSzPts val="1100"/>
+              <a:buFont typeface="Arial"/>
+              <a:buNone/>
+              <a:tabLst/>
+              <a:defRPr/>
+            </a:pPr>
+            <a:r>
+              <a:rPr lang="es-ES" dirty="0" smtClean="0"/>
+              <a:t>El punto de coordenadas cartesianas (0,0,1) corresponde al </a:t>
+            </a:r>
+            <a:r>
+              <a:rPr lang="es-ES" dirty="0" err="1" smtClean="0"/>
+              <a:t>autovector</a:t>
+            </a:r>
+            <a:r>
+              <a:rPr lang="es-ES" dirty="0" smtClean="0"/>
+              <a:t> con </a:t>
+            </a:r>
+            <a:r>
+              <a:rPr lang="es-ES" dirty="0" err="1" smtClean="0"/>
+              <a:t>autovalor</a:t>
+            </a:r>
+            <a:r>
+              <a:rPr lang="es-ES" dirty="0" smtClean="0"/>
+              <a:t> positivo de la matriz de Pauli, mientras que el punto opuesto (0,0,-1) corresponde al </a:t>
+            </a:r>
+            <a:r>
+              <a:rPr lang="es-ES" dirty="0" err="1" smtClean="0"/>
+              <a:t>autovector</a:t>
+            </a:r>
+            <a:r>
+              <a:rPr lang="es-ES" dirty="0" smtClean="0"/>
+              <a:t> con </a:t>
+            </a:r>
+            <a:r>
+              <a:rPr lang="es-ES" dirty="0" err="1" smtClean="0"/>
+              <a:t>autovalor</a:t>
+            </a:r>
+            <a:r>
+              <a:rPr lang="es-ES" dirty="0" smtClean="0"/>
+              <a:t> negativo.</a:t>
+            </a:r>
+          </a:p>
+          <a:p>
+            <a:pPr marL="158750" marR="0" indent="0" algn="l" defTabSz="914400" rtl="0" eaLnBrk="1" fontAlgn="auto" latinLnBrk="0" hangingPunct="1">
+              <a:lnSpc>
+                <a:spcPct val="100000"/>
+              </a:lnSpc>
+              <a:spcBef>
+                <a:spcPts val="0"/>
+              </a:spcBef>
+              <a:spcAft>
+                <a:spcPts val="0"/>
+              </a:spcAft>
+              <a:buClr>
+                <a:srgbClr val="000000"/>
+              </a:buClr>
+              <a:buSzPts val="1100"/>
+              <a:buFont typeface="Arial"/>
+              <a:buNone/>
+              <a:tabLst/>
+              <a:defRPr/>
+            </a:pPr>
+            <a:endParaRPr lang="es-ES" dirty="0" smtClean="0"/>
+          </a:p>
+          <a:p>
+            <a:pPr marL="158750" marR="0" indent="0" algn="l" defTabSz="914400" rtl="0" eaLnBrk="1" fontAlgn="auto" latinLnBrk="0" hangingPunct="1">
+              <a:lnSpc>
+                <a:spcPct val="100000"/>
+              </a:lnSpc>
+              <a:spcBef>
+                <a:spcPts val="0"/>
+              </a:spcBef>
+              <a:spcAft>
+                <a:spcPts val="0"/>
+              </a:spcAft>
+              <a:buClr>
+                <a:srgbClr val="000000"/>
+              </a:buClr>
+              <a:buSzPts val="1100"/>
+              <a:buFont typeface="Arial"/>
+              <a:buNone/>
+              <a:tabLst/>
+              <a:defRPr/>
+            </a:pPr>
+            <a:endParaRPr lang="es-ES" dirty="0" smtClean="0"/>
+          </a:p>
+        </p:txBody>
+      </p:sp>
+    </p:spTree>
+    <p:extLst>
+      <p:ext uri="{BB962C8B-B14F-4D97-AF65-F5344CB8AC3E}">
+        <p14:creationId xmlns:p14="http://schemas.microsoft.com/office/powerpoint/2010/main" val="2486720008"/>
+      </p:ext>
+    </p:extLst>
+  </p:cSld>
+  <p:clrMapOvr>
+    <a:masterClrMapping/>
+  </p:clrMapOvr>
+</p:notes>
+</file>
+
+<file path=ppt/notesSlides/notesSlide5.xml><?xml version="1.0" encoding="utf-8"?>
 <p:notes xmlns:a="http://schemas.openxmlformats.org/drawingml/2006/main" xmlns:r="http://schemas.openxmlformats.org/officeDocument/2006/relationships" xmlns:p="http://schemas.openxmlformats.org/presentationml/2006/main" showMasterSp="0" showMasterPhAnim="0">
   <p:cSld>
     <p:spTree>
@@ -1969,6 +2531,264 @@
               </a:spcAft>
               <a:buNone/>
             </a:pPr>
+            <a:r>
+              <a:rPr lang="es-ES_tradnl" dirty="0" smtClean="0"/>
+              <a:t>El estado de un ordenador cl</a:t>
+            </a:r>
+            <a:r>
+              <a:rPr lang="es-ES_tradnl" dirty="0" smtClean="0"/>
+              <a:t>ásico de dos bits,</a:t>
+            </a:r>
+            <a:r>
+              <a:rPr lang="es-ES_tradnl" baseline="0" dirty="0" smtClean="0"/>
+              <a:t> podría ser</a:t>
+            </a:r>
+          </a:p>
+          <a:p>
+            <a:pPr marL="0" lvl="0" indent="0" algn="l" rtl="0">
+              <a:spcBef>
+                <a:spcPts val="0"/>
+              </a:spcBef>
+              <a:spcAft>
+                <a:spcPts val="0"/>
+              </a:spcAft>
+              <a:buNone/>
+            </a:pPr>
+            <a:r>
+              <a:rPr lang="es-ES_tradnl" baseline="0" dirty="0" smtClean="0"/>
+              <a:t>00</a:t>
+            </a:r>
+          </a:p>
+          <a:p>
+            <a:pPr marL="0" lvl="0" indent="0" algn="l" rtl="0">
+              <a:spcBef>
+                <a:spcPts val="0"/>
+              </a:spcBef>
+              <a:spcAft>
+                <a:spcPts val="0"/>
+              </a:spcAft>
+              <a:buNone/>
+            </a:pPr>
+            <a:r>
+              <a:rPr lang="es-ES_tradnl" baseline="0" dirty="0" smtClean="0"/>
+              <a:t>01</a:t>
+            </a:r>
+          </a:p>
+          <a:p>
+            <a:pPr marL="0" lvl="0" indent="0" algn="l" rtl="0">
+              <a:spcBef>
+                <a:spcPts val="0"/>
+              </a:spcBef>
+              <a:spcAft>
+                <a:spcPts val="0"/>
+              </a:spcAft>
+              <a:buNone/>
+            </a:pPr>
+            <a:r>
+              <a:rPr lang="es-ES_tradnl" baseline="0" dirty="0" smtClean="0"/>
+              <a:t>10</a:t>
+            </a:r>
+          </a:p>
+          <a:p>
+            <a:pPr marL="0" lvl="0" indent="0" algn="l" rtl="0">
+              <a:spcBef>
+                <a:spcPts val="0"/>
+              </a:spcBef>
+              <a:spcAft>
+                <a:spcPts val="0"/>
+              </a:spcAft>
+              <a:buNone/>
+            </a:pPr>
+            <a:r>
+              <a:rPr lang="es-ES_tradnl" baseline="0" dirty="0" smtClean="0"/>
+              <a:t>11</a:t>
+            </a:r>
+          </a:p>
+          <a:p>
+            <a:pPr marL="0" lvl="0" indent="0" algn="l" rtl="0">
+              <a:spcBef>
+                <a:spcPts val="0"/>
+              </a:spcBef>
+              <a:spcAft>
+                <a:spcPts val="0"/>
+              </a:spcAft>
+              <a:buNone/>
+            </a:pPr>
+            <a:endParaRPr lang="es-ES_tradnl" baseline="0" dirty="0" smtClean="0"/>
+          </a:p>
+          <a:p>
+            <a:pPr marL="0" lvl="0" indent="0" algn="l" rtl="0">
+              <a:spcBef>
+                <a:spcPts val="0"/>
+              </a:spcBef>
+              <a:spcAft>
+                <a:spcPts val="0"/>
+              </a:spcAft>
+              <a:buNone/>
+            </a:pPr>
+            <a:r>
+              <a:rPr lang="es-ES_tradnl" baseline="0" dirty="0" smtClean="0"/>
+              <a:t>El estado sería una sola de esas combinaciones en particular.</a:t>
+            </a:r>
+          </a:p>
+          <a:p>
+            <a:pPr marL="0" lvl="0" indent="0" algn="l" rtl="0">
+              <a:spcBef>
+                <a:spcPts val="0"/>
+              </a:spcBef>
+              <a:spcAft>
+                <a:spcPts val="0"/>
+              </a:spcAft>
+              <a:buNone/>
+            </a:pPr>
+            <a:endParaRPr lang="es-ES_tradnl" baseline="0" dirty="0" smtClean="0"/>
+          </a:p>
+          <a:p>
+            <a:pPr marL="0" lvl="0" indent="0" algn="l" rtl="0">
+              <a:spcBef>
+                <a:spcPts val="0"/>
+              </a:spcBef>
+              <a:spcAft>
+                <a:spcPts val="0"/>
+              </a:spcAft>
+              <a:buNone/>
+            </a:pPr>
+            <a:r>
+              <a:rPr lang="es-ES_tradnl" baseline="0" dirty="0" smtClean="0"/>
+              <a:t>El estado de un ordenador cuántico de dos </a:t>
+            </a:r>
+            <a:r>
+              <a:rPr lang="es-ES_tradnl" baseline="0" dirty="0" err="1" smtClean="0"/>
+              <a:t>qubits</a:t>
+            </a:r>
+            <a:r>
+              <a:rPr lang="es-ES_tradnl" baseline="0" dirty="0" smtClean="0"/>
+              <a:t> es una combinación de todas las posibles combinaciones de dos 1s y 0s … con un coeficiente</a:t>
+            </a:r>
+          </a:p>
+          <a:p>
+            <a:pPr marL="0" lvl="0" indent="0" algn="l" rtl="0">
+              <a:spcBef>
+                <a:spcPts val="0"/>
+              </a:spcBef>
+              <a:spcAft>
+                <a:spcPts val="0"/>
+              </a:spcAft>
+              <a:buNone/>
+            </a:pPr>
+            <a:r>
+              <a:rPr lang="es-ES_tradnl" baseline="0" dirty="0" smtClean="0"/>
+              <a:t>Es decir a1*00+a2*01+a3*10+a4*11</a:t>
+            </a:r>
+          </a:p>
+          <a:p>
+            <a:pPr marL="0" lvl="0" indent="0" algn="l" rtl="0">
+              <a:spcBef>
+                <a:spcPts val="0"/>
+              </a:spcBef>
+              <a:spcAft>
+                <a:spcPts val="0"/>
+              </a:spcAft>
+              <a:buNone/>
+            </a:pPr>
+            <a:r>
+              <a:rPr lang="es-ES_tradnl" baseline="0" dirty="0" smtClean="0"/>
+              <a:t>Cada uno de los a sub algo es una combinación que nos dice cada cuanto de cada para 0 1 se componen</a:t>
+            </a:r>
+            <a:endParaRPr lang="es-ES_tradnl" dirty="0" smtClean="0"/>
+          </a:p>
+          <a:p>
+            <a:pPr marL="0" lvl="0" indent="0" algn="l" rtl="0">
+              <a:spcBef>
+                <a:spcPts val="0"/>
+              </a:spcBef>
+              <a:spcAft>
+                <a:spcPts val="0"/>
+              </a:spcAft>
+              <a:buNone/>
+            </a:pPr>
+            <a:endParaRPr lang="es-ES_tradnl" dirty="0" smtClean="0"/>
+          </a:p>
+          <a:p>
+            <a:pPr marL="0" lvl="0" indent="0" algn="l" rtl="0">
+              <a:spcBef>
+                <a:spcPts val="0"/>
+              </a:spcBef>
+              <a:spcAft>
+                <a:spcPts val="0"/>
+              </a:spcAft>
+              <a:buNone/>
+            </a:pPr>
+            <a:r>
+              <a:rPr lang="es-ES_tradnl" dirty="0" smtClean="0"/>
+              <a:t>La cantidad de informaci</a:t>
+            </a:r>
+            <a:r>
+              <a:rPr lang="es-ES_tradnl" dirty="0" smtClean="0"/>
+              <a:t>ón que contiene un ordenador cuántico tiene tamaño</a:t>
+            </a:r>
+            <a:r>
+              <a:rPr lang="es-ES_tradnl" baseline="0" dirty="0" smtClean="0"/>
+              <a:t> de 2 elevado a N</a:t>
+            </a:r>
+          </a:p>
+          <a:p>
+            <a:pPr marL="0" lvl="0" indent="0" algn="l" rtl="0">
+              <a:spcBef>
+                <a:spcPts val="0"/>
+              </a:spcBef>
+              <a:spcAft>
+                <a:spcPts val="0"/>
+              </a:spcAft>
+              <a:buNone/>
+            </a:pPr>
+            <a:endParaRPr lang="es-ES_tradnl" baseline="0" dirty="0" smtClean="0"/>
+          </a:p>
+          <a:p>
+            <a:pPr marL="0" lvl="0" indent="0" algn="l" rtl="0">
+              <a:spcBef>
+                <a:spcPts val="0"/>
+              </a:spcBef>
+              <a:spcAft>
+                <a:spcPts val="0"/>
+              </a:spcAft>
+              <a:buNone/>
+            </a:pPr>
+            <a:r>
+              <a:rPr lang="es-ES_tradnl" baseline="0" dirty="0" smtClean="0"/>
+              <a:t>Esto implica que un ordenador cuántico pueda realizar muchos más cálculos simultáneamente: un sistema con N </a:t>
+            </a:r>
+            <a:r>
+              <a:rPr lang="es-ES_tradnl" baseline="0" dirty="0" err="1" smtClean="0"/>
+              <a:t>qubits</a:t>
+            </a:r>
+            <a:r>
+              <a:rPr lang="es-ES_tradnl" baseline="0" dirty="0" smtClean="0"/>
+              <a:t> podría ejecutar 2N cálculos en paralelo.</a:t>
+            </a:r>
+          </a:p>
+          <a:p>
+            <a:pPr marL="0" lvl="0" indent="0" algn="l" rtl="0">
+              <a:spcBef>
+                <a:spcPts val="0"/>
+              </a:spcBef>
+              <a:spcAft>
+                <a:spcPts val="0"/>
+              </a:spcAft>
+              <a:buNone/>
+            </a:pPr>
+            <a:endParaRPr lang="es-ES_tradnl" baseline="0" dirty="0" smtClean="0"/>
+          </a:p>
+          <a:p>
+            <a:pPr marL="0" lvl="0" indent="0" algn="l" rtl="0">
+              <a:spcBef>
+                <a:spcPts val="0"/>
+              </a:spcBef>
+              <a:spcAft>
+                <a:spcPts val="0"/>
+              </a:spcAft>
+              <a:buNone/>
+            </a:pPr>
             <a:endParaRPr dirty="0"/>
           </a:p>
         </p:txBody>
@@ -1981,7 +2801,7 @@
 </p:notes>
 </file>
 
-<file path=ppt/notesSlides/notesSlide5.xml><?xml version="1.0" encoding="utf-8"?>
+<file path=ppt/notesSlides/notesSlide6.xml><?xml version="1.0" encoding="utf-8"?>
 <p:notes xmlns:a="http://schemas.openxmlformats.org/drawingml/2006/main" xmlns:r="http://schemas.openxmlformats.org/officeDocument/2006/relationships" xmlns:p="http://schemas.openxmlformats.org/presentationml/2006/main" showMasterSp="0" showMasterPhAnim="0">
   <p:cSld>
     <p:spTree>
@@ -2073,7 +2893,99 @@
               </a:spcAft>
               <a:buNone/>
             </a:pPr>
-            <a:endParaRPr/>
+            <a:r>
+              <a:rPr lang="es-ES_tradnl" dirty="0" smtClean="0"/>
+              <a:t>Un ordenador funciona mediante</a:t>
+            </a:r>
+            <a:r>
+              <a:rPr lang="es-ES_tradnl" baseline="0" dirty="0" smtClean="0"/>
+              <a:t> cambios de estado, para pasar de un estado a otro se utilizan operaciones l</a:t>
+            </a:r>
+            <a:r>
+              <a:rPr lang="es-ES_tradnl" baseline="0" dirty="0" smtClean="0"/>
+              <a:t>ógicas sobre los bits del estado. Estas operaciones se realizan mediante puertas lógicas.</a:t>
+            </a:r>
+          </a:p>
+          <a:p>
+            <a:pPr marL="0" lvl="0" indent="0" algn="l" rtl="0">
+              <a:spcBef>
+                <a:spcPts val="0"/>
+              </a:spcBef>
+              <a:spcAft>
+                <a:spcPts val="0"/>
+              </a:spcAft>
+              <a:buNone/>
+            </a:pPr>
+            <a:endParaRPr lang="es-ES_tradnl" baseline="0" dirty="0" smtClean="0"/>
+          </a:p>
+          <a:p>
+            <a:pPr marL="0" lvl="0" indent="0" algn="l" rtl="0">
+              <a:spcBef>
+                <a:spcPts val="0"/>
+              </a:spcBef>
+              <a:spcAft>
+                <a:spcPts val="0"/>
+              </a:spcAft>
+              <a:buNone/>
+            </a:pPr>
+            <a:r>
+              <a:rPr lang="es-ES_tradnl" baseline="0" dirty="0" smtClean="0"/>
+              <a:t>Los bits que definen el estado en el que ya está el ordenador.</a:t>
+            </a:r>
+          </a:p>
+          <a:p>
+            <a:pPr marL="0" lvl="0" indent="0" algn="l" rtl="0">
+              <a:spcBef>
+                <a:spcPts val="0"/>
+              </a:spcBef>
+              <a:spcAft>
+                <a:spcPts val="0"/>
+              </a:spcAft>
+              <a:buNone/>
+            </a:pPr>
+            <a:endParaRPr lang="es-ES_tradnl" baseline="0" dirty="0" smtClean="0"/>
+          </a:p>
+          <a:p>
+            <a:pPr marL="0" lvl="0" indent="0" algn="l" rtl="0">
+              <a:spcBef>
+                <a:spcPts val="0"/>
+              </a:spcBef>
+              <a:spcAft>
+                <a:spcPts val="0"/>
+              </a:spcAft>
+              <a:buNone/>
+            </a:pPr>
+            <a:r>
+              <a:rPr lang="es-ES_tradnl" baseline="0" dirty="0" smtClean="0"/>
+              <a:t>Para pasar de un estado del ordenador a otro, lo que hacemos es usar una operación lógica sobre los bits que definen el estado en el que ya está el ordenador. </a:t>
+            </a:r>
+          </a:p>
+          <a:p>
+            <a:pPr marL="0" lvl="0" indent="0" algn="l" rtl="0">
+              <a:spcBef>
+                <a:spcPts val="0"/>
+              </a:spcBef>
+              <a:spcAft>
+                <a:spcPts val="0"/>
+              </a:spcAft>
+              <a:buNone/>
+            </a:pPr>
+            <a:r>
+              <a:rPr lang="es-ES_tradnl" baseline="0" dirty="0" smtClean="0"/>
+              <a:t>Estas operaciones se llaman puertas lógicas … uniendo muchas de esas operaciones lógicas … formamos un algoritmo …</a:t>
+            </a:r>
+          </a:p>
+          <a:p>
+            <a:pPr marL="0" lvl="0" indent="0" algn="l" rtl="0">
+              <a:spcBef>
+                <a:spcPts val="0"/>
+              </a:spcBef>
+              <a:spcAft>
+                <a:spcPts val="0"/>
+              </a:spcAft>
+              <a:buNone/>
+            </a:pPr>
+            <a:endParaRPr dirty="0"/>
           </a:p>
         </p:txBody>
       </p:sp>
@@ -2085,7 +2997,97 @@
 </p:notes>
 </file>
 
-<file path=ppt/notesSlides/notesSlide6.xml><?xml version="1.0" encoding="utf-8"?>
+<file path=ppt/notesSlides/notesSlide7.xml><?xml version="1.0" encoding="utf-8"?>
+<p:notes xmlns:a="http://schemas.openxmlformats.org/drawingml/2006/main" xmlns:r="http://schemas.openxmlformats.org/officeDocument/2006/relationships" xmlns:p="http://schemas.openxmlformats.org/presentationml/2006/main">
+  <p:cSld>
+    <p:spTree>
+      <p:nvGrpSpPr>
+        <p:cNvPr id="1" name=""/>
+        <p:cNvGrpSpPr/>
+        <p:nvPr/>
+      </p:nvGrpSpPr>
+      <p:grpSpPr>
+        <a:xfrm>
+          <a:off x="0" y="0"/>
+          <a:ext cx="0" cy="0"/>
+          <a:chOff x="0" y="0"/>
+          <a:chExt cx="0" cy="0"/>
+        </a:xfrm>
+      </p:grpSpPr>
+      <p:sp>
+        <p:nvSpPr>
+          <p:cNvPr id="2" name="Marcador de imagen de diapositiva 1"/>
+          <p:cNvSpPr>
+            <a:spLocks noGrp="1" noRot="1" noChangeAspect="1"/>
+          </p:cNvSpPr>
+          <p:nvPr>
+            <p:ph type="sldImg"/>
+          </p:nvPr>
+        </p:nvSpPr>
+        <p:spPr>
+          <a:xfrm>
+            <a:off x="381000" y="685800"/>
+            <a:ext cx="6096000" cy="3429000"/>
+          </a:xfrm>
+        </p:spPr>
+      </p:sp>
+      <p:sp>
+        <p:nvSpPr>
+          <p:cNvPr id="3" name="Marcador de notas 2"/>
+          <p:cNvSpPr>
+            <a:spLocks noGrp="1"/>
+          </p:cNvSpPr>
+          <p:nvPr>
+            <p:ph type="body" idx="1"/>
+          </p:nvPr>
+        </p:nvSpPr>
+        <p:spPr/>
+        <p:txBody>
+          <a:bodyPr/>
+          <a:lstStyle/>
+          <a:p>
+            <a:r>
+              <a:rPr lang="es-ES" dirty="0" smtClean="0"/>
+              <a:t>En el ordenador</a:t>
+            </a:r>
+            <a:r>
+              <a:rPr lang="es-ES" baseline="0" dirty="0" smtClean="0"/>
+              <a:t> cu</a:t>
+            </a:r>
+            <a:r>
+              <a:rPr lang="es-ES" baseline="0" dirty="0" smtClean="0"/>
+              <a:t>ántico pasa lo mismo.</a:t>
+            </a:r>
+          </a:p>
+          <a:p>
+            <a:r>
+              <a:rPr lang="es-ES" baseline="0" dirty="0" smtClean="0"/>
+              <a:t>Vamos pasando del estado de un ordenador cuántico a través de operaciones puertas cuánticas … hay varias</a:t>
+            </a:r>
+          </a:p>
+          <a:p>
+            <a:r>
+              <a:rPr lang="es-ES" baseline="0" dirty="0" smtClean="0"/>
+              <a:t>Se encadenan las puertas cuánticas para formar algoritmos que llevan al ordenador a un estado que da la solución </a:t>
+            </a:r>
+            <a:endParaRPr lang="es-ES" dirty="0"/>
+          </a:p>
+        </p:txBody>
+      </p:sp>
+    </p:spTree>
+    <p:extLst>
+      <p:ext uri="{BB962C8B-B14F-4D97-AF65-F5344CB8AC3E}">
+        <p14:creationId xmlns:p14="http://schemas.microsoft.com/office/powerpoint/2010/main" val="1272569656"/>
+      </p:ext>
+    </p:extLst>
+  </p:cSld>
+  <p:clrMapOvr>
+    <a:masterClrMapping/>
+  </p:clrMapOvr>
+</p:notes>
+</file>
+
+<file path=ppt/notesSlides/notesSlide8.xml><?xml version="1.0" encoding="utf-8"?>
 <p:notes xmlns:a="http://schemas.openxmlformats.org/drawingml/2006/main" xmlns:r="http://schemas.openxmlformats.org/officeDocument/2006/relationships" xmlns:p="http://schemas.openxmlformats.org/presentationml/2006/main" showMasterSp="0" showMasterPhAnim="0">
   <p:cSld>
     <p:spTree>
@@ -2177,7 +3179,19 @@
               </a:spcAft>
               <a:buNone/>
             </a:pPr>
-            <a:endParaRPr/>
+            <a:r>
+              <a:rPr lang="es-ES_tradnl" dirty="0" smtClean="0"/>
+              <a:t>Esto quiere decir que un</a:t>
+            </a:r>
+            <a:r>
+              <a:rPr lang="es-ES_tradnl" baseline="0" dirty="0" smtClean="0"/>
+              <a:t> ordenador cu</a:t>
+            </a:r>
+            <a:r>
+              <a:rPr lang="es-ES_tradnl" baseline="0" dirty="0" smtClean="0"/>
+              <a:t>ántico puede hacer lo mismo que un ordenador clásico y más.</a:t>
+            </a:r>
+            <a:endParaRPr dirty="0"/>
           </a:p>
         </p:txBody>
       </p:sp>
@@ -2189,7 +3203,7 @@
 </p:notes>
 </file>
 
-<file path=ppt/notesSlides/notesSlide7.xml><?xml version="1.0" encoding="utf-8"?>
+<file path=ppt/notesSlides/notesSlide9.xml><?xml version="1.0" encoding="utf-8"?>
 <p:notes xmlns:a="http://schemas.openxmlformats.org/drawingml/2006/main" xmlns:r="http://schemas.openxmlformats.org/officeDocument/2006/relationships" xmlns:p="http://schemas.openxmlformats.org/presentationml/2006/main" showMasterSp="0" showMasterPhAnim="0">
   <p:cSld>
     <p:spTree>
@@ -2250,214 +3264,6 @@
       <p:sp>
         <p:nvSpPr>
           <p:cNvPr id="199" name="Google Shape;199;g6d3edeccc4_1_76:notes"/>
-          <p:cNvSpPr txBox="1">
-            <a:spLocks noGrp="1"/>
-          </p:cNvSpPr>
-          <p:nvPr>
-            <p:ph type="body" idx="1"/>
-          </p:nvPr>
-        </p:nvSpPr>
-        <p:spPr>
-          <a:xfrm>
-            <a:off x="685800" y="4343400"/>
-            <a:ext cx="5486400" cy="4114800"/>
-          </a:xfrm>
-          <a:prstGeom prst="rect">
-            <a:avLst/>
-          </a:prstGeom>
-        </p:spPr>
-        <p:txBody>
-          <a:bodyPr spcFirstLastPara="1" wrap="square" lIns="91425" tIns="91425" rIns="91425" bIns="91425" anchor="t" anchorCtr="0">
-            <a:noAutofit/>
-          </a:bodyPr>
-          <a:lstStyle/>
-          <a:p>
-            <a:pPr marL="0" lvl="0" indent="0" algn="l" rtl="0">
-              <a:spcBef>
-                <a:spcPts val="0"/>
-              </a:spcBef>
-              <a:spcAft>
-                <a:spcPts val="0"/>
-              </a:spcAft>
-              <a:buNone/>
-            </a:pPr>
-            <a:endParaRPr/>
-          </a:p>
-        </p:txBody>
-      </p:sp>
-    </p:spTree>
-  </p:cSld>
-  <p:clrMapOvr>
-    <a:masterClrMapping/>
-  </p:clrMapOvr>
-</p:notes>
-</file>
-
-<file path=ppt/notesSlides/notesSlide8.xml><?xml version="1.0" encoding="utf-8"?>
-<p:notes xmlns:a="http://schemas.openxmlformats.org/drawingml/2006/main" xmlns:r="http://schemas.openxmlformats.org/officeDocument/2006/relationships" xmlns:p="http://schemas.openxmlformats.org/presentationml/2006/main" showMasterSp="0" showMasterPhAnim="0">
-  <p:cSld>
-    <p:spTree>
-      <p:nvGrpSpPr>
-        <p:cNvPr id="1" name="Shape 204"/>
-        <p:cNvGrpSpPr/>
-        <p:nvPr/>
-      </p:nvGrpSpPr>
-      <p:grpSpPr>
-        <a:xfrm>
-          <a:off x="0" y="0"/>
-          <a:ext cx="0" cy="0"/>
-          <a:chOff x="0" y="0"/>
-          <a:chExt cx="0" cy="0"/>
-        </a:xfrm>
-      </p:grpSpPr>
-      <p:sp>
-        <p:nvSpPr>
-          <p:cNvPr id="205" name="Google Shape;205;g6d3edeccc4_1_86:notes"/>
-          <p:cNvSpPr>
-            <a:spLocks noGrp="1" noRot="1" noChangeAspect="1"/>
-          </p:cNvSpPr>
-          <p:nvPr>
-            <p:ph type="sldImg" idx="2"/>
-          </p:nvPr>
-        </p:nvSpPr>
-        <p:spPr>
-          <a:xfrm>
-            <a:off x="381000" y="685800"/>
-            <a:ext cx="6096000" cy="3429000"/>
-          </a:xfrm>
-          <a:custGeom>
-            <a:avLst/>
-            <a:gdLst/>
-            <a:ahLst/>
-            <a:cxnLst/>
-            <a:rect l="l" t="t" r="r" b="b"/>
-            <a:pathLst>
-              <a:path w="120000" h="120000" extrusionOk="0">
-                <a:moveTo>
-                  <a:pt x="0" y="0"/>
-                </a:moveTo>
-                <a:lnTo>
-                  <a:pt x="120000" y="0"/>
-                </a:lnTo>
-                <a:lnTo>
-                  <a:pt x="120000" y="120000"/>
-                </a:lnTo>
-                <a:lnTo>
-                  <a:pt x="0" y="120000"/>
-                </a:lnTo>
-                <a:close/>
-              </a:path>
-            </a:pathLst>
-          </a:custGeom>
-        </p:spPr>
-      </p:sp>
-      <p:sp>
-        <p:nvSpPr>
-          <p:cNvPr id="206" name="Google Shape;206;g6d3edeccc4_1_86:notes"/>
-          <p:cNvSpPr txBox="1">
-            <a:spLocks noGrp="1"/>
-          </p:cNvSpPr>
-          <p:nvPr>
-            <p:ph type="body" idx="1"/>
-          </p:nvPr>
-        </p:nvSpPr>
-        <p:spPr>
-          <a:xfrm>
-            <a:off x="685800" y="4343400"/>
-            <a:ext cx="5486400" cy="4114800"/>
-          </a:xfrm>
-          <a:prstGeom prst="rect">
-            <a:avLst/>
-          </a:prstGeom>
-        </p:spPr>
-        <p:txBody>
-          <a:bodyPr spcFirstLastPara="1" wrap="square" lIns="91425" tIns="91425" rIns="91425" bIns="91425" anchor="t" anchorCtr="0">
-            <a:noAutofit/>
-          </a:bodyPr>
-          <a:lstStyle/>
-          <a:p>
-            <a:pPr marL="0" lvl="0" indent="0" algn="l" rtl="0">
-              <a:spcBef>
-                <a:spcPts val="0"/>
-              </a:spcBef>
-              <a:spcAft>
-                <a:spcPts val="0"/>
-              </a:spcAft>
-              <a:buNone/>
-            </a:pPr>
-            <a:endParaRPr/>
-          </a:p>
-        </p:txBody>
-      </p:sp>
-    </p:spTree>
-  </p:cSld>
-  <p:clrMapOvr>
-    <a:masterClrMapping/>
-  </p:clrMapOvr>
-</p:notes>
-</file>
-
-<file path=ppt/notesSlides/notesSlide9.xml><?xml version="1.0" encoding="utf-8"?>
-<p:notes xmlns:a="http://schemas.openxmlformats.org/drawingml/2006/main" xmlns:r="http://schemas.openxmlformats.org/officeDocument/2006/relationships" xmlns:p="http://schemas.openxmlformats.org/presentationml/2006/main" showMasterSp="0" showMasterPhAnim="0">
-  <p:cSld>
-    <p:spTree>
-      <p:nvGrpSpPr>
-        <p:cNvPr id="1" name="Shape 213"/>
-        <p:cNvGrpSpPr/>
-        <p:nvPr/>
-      </p:nvGrpSpPr>
-      <p:grpSpPr>
-        <a:xfrm>
-          <a:off x="0" y="0"/>
-          <a:ext cx="0" cy="0"/>
-          <a:chOff x="0" y="0"/>
-          <a:chExt cx="0" cy="0"/>
-        </a:xfrm>
-      </p:grpSpPr>
-      <p:sp>
-        <p:nvSpPr>
-          <p:cNvPr id="214" name="Google Shape;214;g76631abf04_0_0:notes"/>
-          <p:cNvSpPr>
-            <a:spLocks noGrp="1" noRot="1" noChangeAspect="1"/>
-          </p:cNvSpPr>
-          <p:nvPr>
-            <p:ph type="sldImg" idx="2"/>
-          </p:nvPr>
-        </p:nvSpPr>
-        <p:spPr>
-          <a:xfrm>
-            <a:off x="381000" y="685800"/>
-            <a:ext cx="6096000" cy="3429000"/>
-          </a:xfrm>
-          <a:custGeom>
-            <a:avLst/>
-            <a:gdLst/>
-            <a:ahLst/>
-            <a:cxnLst/>
-            <a:rect l="l" t="t" r="r" b="b"/>
-            <a:pathLst>
-              <a:path w="120000" h="120000" extrusionOk="0">
-                <a:moveTo>
-                  <a:pt x="0" y="0"/>
-                </a:moveTo>
-                <a:lnTo>
-                  <a:pt x="120000" y="0"/>
-                </a:lnTo>
-                <a:lnTo>
-                  <a:pt x="120000" y="120000"/>
-                </a:lnTo>
-                <a:lnTo>
-                  <a:pt x="0" y="120000"/>
-                </a:lnTo>
-                <a:close/>
-              </a:path>
-            </a:pathLst>
-          </a:custGeom>
-        </p:spPr>
-      </p:sp>
-      <p:sp>
-        <p:nvSpPr>
-          <p:cNvPr id="215" name="Google Shape;215;g76631abf04_0_0:notes"/>
           <p:cNvSpPr txBox="1">
             <a:spLocks noGrp="1"/>
           </p:cNvSpPr>
@@ -7619,6 +8425,13 @@
   <p:clrMapOvr>
     <a:masterClrMapping/>
   </p:clrMapOvr>
+  <p:timing>
+    <p:tnLst>
+      <p:par>
+        <p:cTn xmlns:p14="http://schemas.microsoft.com/office/powerpoint/2010/main" id="1" dur="indefinite" restart="never" nodeType="tmRoot"/>
+      </p:par>
+    </p:tnLst>
+  </p:timing>
 </p:sld>
 </file>
 
@@ -7746,14 +8559,14 @@
                 <a:gridCol w="1084525">
                   <a:extLst>
                     <a:ext uri="{9D8B030D-6E8A-4147-A177-3AD203B41FA5}">
-                      <a16:colId xmlns="" xmlns:a16="http://schemas.microsoft.com/office/drawing/2014/main" val="20000"/>
+                      <a16:colId xmlns:a16="http://schemas.microsoft.com/office/drawing/2014/main" xmlns="" val="20000"/>
                     </a:ext>
                   </a:extLst>
                 </a:gridCol>
                 <a:gridCol w="1084525">
                   <a:extLst>
                     <a:ext uri="{9D8B030D-6E8A-4147-A177-3AD203B41FA5}">
-                      <a16:colId xmlns="" xmlns:a16="http://schemas.microsoft.com/office/drawing/2014/main" val="20001"/>
+                      <a16:colId xmlns:a16="http://schemas.microsoft.com/office/drawing/2014/main" xmlns="" val="20001"/>
                     </a:ext>
                   </a:extLst>
                 </a:gridCol>
@@ -7931,7 +8744,7 @@
                 </a:tc>
                 <a:extLst>
                   <a:ext uri="{0D108BD9-81ED-4DB2-BD59-A6C34878D82A}">
-                    <a16:rowId xmlns="" xmlns:a16="http://schemas.microsoft.com/office/drawing/2014/main" val="10000"/>
+                    <a16:rowId xmlns:a16="http://schemas.microsoft.com/office/drawing/2014/main" xmlns="" val="10000"/>
                   </a:ext>
                 </a:extLst>
               </a:tr>
@@ -8064,7 +8877,7 @@
                 </a:tc>
                 <a:extLst>
                   <a:ext uri="{0D108BD9-81ED-4DB2-BD59-A6C34878D82A}">
-                    <a16:rowId xmlns="" xmlns:a16="http://schemas.microsoft.com/office/drawing/2014/main" val="10001"/>
+                    <a16:rowId xmlns:a16="http://schemas.microsoft.com/office/drawing/2014/main" xmlns="" val="10001"/>
                   </a:ext>
                 </a:extLst>
               </a:tr>
@@ -8197,7 +9010,7 @@
                 </a:tc>
                 <a:extLst>
                   <a:ext uri="{0D108BD9-81ED-4DB2-BD59-A6C34878D82A}">
-                    <a16:rowId xmlns="" xmlns:a16="http://schemas.microsoft.com/office/drawing/2014/main" val="10002"/>
+                    <a16:rowId xmlns:a16="http://schemas.microsoft.com/office/drawing/2014/main" xmlns="" val="10002"/>
                   </a:ext>
                 </a:extLst>
               </a:tr>
@@ -8242,6 +9055,13 @@
   <p:clrMapOvr>
     <a:masterClrMapping/>
   </p:clrMapOvr>
+  <p:timing>
+    <p:tnLst>
+      <p:par>
+        <p:cTn xmlns:p14="http://schemas.microsoft.com/office/powerpoint/2010/main" id="1" dur="indefinite" restart="never" nodeType="tmRoot"/>
+      </p:par>
+    </p:tnLst>
+  </p:timing>
 </p:sld>
 </file>
 
@@ -8347,14 +9167,14 @@
                 <a:gridCol w="1084525">
                   <a:extLst>
                     <a:ext uri="{9D8B030D-6E8A-4147-A177-3AD203B41FA5}">
-                      <a16:colId xmlns="" xmlns:a16="http://schemas.microsoft.com/office/drawing/2014/main" val="20000"/>
+                      <a16:colId xmlns:a16="http://schemas.microsoft.com/office/drawing/2014/main" xmlns="" val="20000"/>
                     </a:ext>
                   </a:extLst>
                 </a:gridCol>
                 <a:gridCol w="1084525">
                   <a:extLst>
                     <a:ext uri="{9D8B030D-6E8A-4147-A177-3AD203B41FA5}">
-                      <a16:colId xmlns="" xmlns:a16="http://schemas.microsoft.com/office/drawing/2014/main" val="20001"/>
+                      <a16:colId xmlns:a16="http://schemas.microsoft.com/office/drawing/2014/main" xmlns="" val="20001"/>
                     </a:ext>
                   </a:extLst>
                 </a:gridCol>
@@ -8494,7 +9314,7 @@
                 </a:tc>
                 <a:extLst>
                   <a:ext uri="{0D108BD9-81ED-4DB2-BD59-A6C34878D82A}">
-                    <a16:rowId xmlns="" xmlns:a16="http://schemas.microsoft.com/office/drawing/2014/main" val="10000"/>
+                    <a16:rowId xmlns:a16="http://schemas.microsoft.com/office/drawing/2014/main" xmlns="" val="10000"/>
                   </a:ext>
                 </a:extLst>
               </a:tr>
@@ -8627,7 +9447,7 @@
                 </a:tc>
                 <a:extLst>
                   <a:ext uri="{0D108BD9-81ED-4DB2-BD59-A6C34878D82A}">
-                    <a16:rowId xmlns="" xmlns:a16="http://schemas.microsoft.com/office/drawing/2014/main" val="10001"/>
+                    <a16:rowId xmlns:a16="http://schemas.microsoft.com/office/drawing/2014/main" xmlns="" val="10001"/>
                   </a:ext>
                 </a:extLst>
               </a:tr>
@@ -8760,7 +9580,7 @@
                 </a:tc>
                 <a:extLst>
                   <a:ext uri="{0D108BD9-81ED-4DB2-BD59-A6C34878D82A}">
-                    <a16:rowId xmlns="" xmlns:a16="http://schemas.microsoft.com/office/drawing/2014/main" val="10002"/>
+                    <a16:rowId xmlns:a16="http://schemas.microsoft.com/office/drawing/2014/main" xmlns="" val="10002"/>
                   </a:ext>
                 </a:extLst>
               </a:tr>
@@ -8920,6 +9740,13 @@
   <p:clrMapOvr>
     <a:masterClrMapping/>
   </p:clrMapOvr>
+  <p:timing>
+    <p:tnLst>
+      <p:par>
+        <p:cTn xmlns:p14="http://schemas.microsoft.com/office/powerpoint/2010/main" id="1" dur="indefinite" restart="never" nodeType="tmRoot"/>
+      </p:par>
+    </p:tnLst>
+  </p:timing>
 </p:sld>
 </file>
 
@@ -9131,6 +9958,13 @@
   <p:clrMapOvr>
     <a:masterClrMapping/>
   </p:clrMapOvr>
+  <p:timing>
+    <p:tnLst>
+      <p:par>
+        <p:cTn xmlns:p14="http://schemas.microsoft.com/office/powerpoint/2010/main" id="1" dur="indefinite" restart="never" nodeType="tmRoot"/>
+      </p:par>
+    </p:tnLst>
+  </p:timing>
 </p:sld>
 </file>
 
@@ -9322,6 +10156,13 @@
   <p:clrMapOvr>
     <a:masterClrMapping/>
   </p:clrMapOvr>
+  <p:timing>
+    <p:tnLst>
+      <p:par>
+        <p:cTn xmlns:p14="http://schemas.microsoft.com/office/powerpoint/2010/main" id="1" dur="indefinite" restart="never" nodeType="tmRoot"/>
+      </p:par>
+    </p:tnLst>
+  </p:timing>
 </p:sld>
 </file>
 
@@ -9400,7 +10241,7 @@
         </p:blipFill>
         <p:spPr>
           <a:xfrm>
-            <a:off x="2054655" y="716000"/>
+            <a:off x="2054655" y="607929"/>
             <a:ext cx="5031712" cy="4247926"/>
           </a:xfrm>
           <a:prstGeom prst="rect">
@@ -9408,11 +10249,59 @@
           </a:prstGeom>
         </p:spPr>
       </p:pic>
+      <p:sp>
+        <p:nvSpPr>
+          <p:cNvPr id="3" name="CuadroTexto 2"/>
+          <p:cNvSpPr txBox="1"/>
+          <p:nvPr/>
+        </p:nvSpPr>
+        <p:spPr>
+          <a:xfrm>
+            <a:off x="-54048" y="4862741"/>
+            <a:ext cx="9387757" cy="461665"/>
+          </a:xfrm>
+          <a:prstGeom prst="rect">
+            <a:avLst/>
+          </a:prstGeom>
+          <a:noFill/>
+        </p:spPr>
+        <p:txBody>
+          <a:bodyPr wrap="none" rtlCol="0">
+            <a:spAutoFit/>
+          </a:bodyPr>
+          <a:lstStyle/>
+          <a:p>
+            <a:r>
+              <a:rPr lang="es-ES" sz="1200" dirty="0">
+                <a:hlinkClick r:id="rId4"/>
+              </a:rPr>
+              <a:t>https://blog.acolyer.org/2018/02/02/polynomial-time-algorithms-for-prime-factorization-and-discrete-logarithms-on-a-quantum-computer</a:t>
+            </a:r>
+            <a:r>
+              <a:rPr lang="es-ES" sz="1200" dirty="0" smtClean="0">
+                <a:hlinkClick r:id="rId4"/>
+              </a:rPr>
+              <a:t>/</a:t>
+            </a:r>
+            <a:endParaRPr lang="es-ES" sz="1200" dirty="0" smtClean="0"/>
+          </a:p>
+          <a:p>
+            <a:endParaRPr lang="es-ES" sz="1200" dirty="0"/>
+          </a:p>
+        </p:txBody>
+      </p:sp>
     </p:spTree>
   </p:cSld>
   <p:clrMapOvr>
     <a:masterClrMapping/>
   </p:clrMapOvr>
+  <p:timing>
+    <p:tnLst>
+      <p:par>
+        <p:cTn xmlns:p14="http://schemas.microsoft.com/office/powerpoint/2010/main" id="1" dur="indefinite" restart="never" nodeType="tmRoot"/>
+      </p:par>
+    </p:tnLst>
+  </p:timing>
 </p:sld>
 </file>
 
@@ -9634,6 +10523,13 @@
   <p:clrMapOvr>
     <a:masterClrMapping/>
   </p:clrMapOvr>
+  <p:timing>
+    <p:tnLst>
+      <p:par>
+        <p:cTn xmlns:p14="http://schemas.microsoft.com/office/powerpoint/2010/main" id="1" dur="indefinite" restart="never" nodeType="tmRoot"/>
+      </p:par>
+    </p:tnLst>
+  </p:timing>
 </p:sld>
 </file>
 
@@ -9785,6 +10681,13 @@
   <p:clrMapOvr>
     <a:masterClrMapping/>
   </p:clrMapOvr>
+  <p:timing>
+    <p:tnLst>
+      <p:par>
+        <p:cTn xmlns:p14="http://schemas.microsoft.com/office/powerpoint/2010/main" id="1" dur="indefinite" restart="never" nodeType="tmRoot"/>
+      </p:par>
+    </p:tnLst>
+  </p:timing>
 </p:sld>
 </file>
 
@@ -10015,6 +10918,13 @@
   <p:clrMapOvr>
     <a:masterClrMapping/>
   </p:clrMapOvr>
+  <p:timing>
+    <p:tnLst>
+      <p:par>
+        <p:cTn xmlns:p14="http://schemas.microsoft.com/office/powerpoint/2010/main" id="1" dur="indefinite" restart="never" nodeType="tmRoot"/>
+      </p:par>
+    </p:tnLst>
+  </p:timing>
 </p:sld>
 </file>
 
@@ -10704,6 +11614,13 @@
   <p:clrMapOvr>
     <a:masterClrMapping/>
   </p:clrMapOvr>
+  <p:timing>
+    <p:tnLst>
+      <p:par>
+        <p:cTn xmlns:p14="http://schemas.microsoft.com/office/powerpoint/2010/main" id="1" dur="indefinite" restart="never" nodeType="tmRoot"/>
+      </p:par>
+    </p:tnLst>
+  </p:timing>
 </p:sld>
 </file>
 
@@ -10838,14 +11755,14 @@
                 <a:gridCol w="2462125">
                   <a:extLst>
                     <a:ext uri="{9D8B030D-6E8A-4147-A177-3AD203B41FA5}">
-                      <a16:colId xmlns="" xmlns:a16="http://schemas.microsoft.com/office/drawing/2014/main" val="20000"/>
+                      <a16:colId xmlns:a16="http://schemas.microsoft.com/office/drawing/2014/main" xmlns="" val="20000"/>
                     </a:ext>
                   </a:extLst>
                 </a:gridCol>
                 <a:gridCol w="2462125">
                   <a:extLst>
                     <a:ext uri="{9D8B030D-6E8A-4147-A177-3AD203B41FA5}">
-                      <a16:colId xmlns="" xmlns:a16="http://schemas.microsoft.com/office/drawing/2014/main" val="20001"/>
+                      <a16:colId xmlns:a16="http://schemas.microsoft.com/office/drawing/2014/main" xmlns="" val="20001"/>
                     </a:ext>
                   </a:extLst>
                 </a:gridCol>
@@ -10979,7 +11896,7 @@
                 </a:tc>
                 <a:extLst>
                   <a:ext uri="{0D108BD9-81ED-4DB2-BD59-A6C34878D82A}">
-                    <a16:rowId xmlns="" xmlns:a16="http://schemas.microsoft.com/office/drawing/2014/main" val="10000"/>
+                    <a16:rowId xmlns:a16="http://schemas.microsoft.com/office/drawing/2014/main" xmlns="" val="10000"/>
                   </a:ext>
                 </a:extLst>
               </a:tr>
@@ -11112,7 +12029,7 @@
                 </a:tc>
                 <a:extLst>
                   <a:ext uri="{0D108BD9-81ED-4DB2-BD59-A6C34878D82A}">
-                    <a16:rowId xmlns="" xmlns:a16="http://schemas.microsoft.com/office/drawing/2014/main" val="10001"/>
+                    <a16:rowId xmlns:a16="http://schemas.microsoft.com/office/drawing/2014/main" xmlns="" val="10001"/>
                   </a:ext>
                 </a:extLst>
               </a:tr>
@@ -11245,7 +12162,7 @@
                 </a:tc>
                 <a:extLst>
                   <a:ext uri="{0D108BD9-81ED-4DB2-BD59-A6C34878D82A}">
-                    <a16:rowId xmlns="" xmlns:a16="http://schemas.microsoft.com/office/drawing/2014/main" val="10002"/>
+                    <a16:rowId xmlns:a16="http://schemas.microsoft.com/office/drawing/2014/main" xmlns="" val="10002"/>
                   </a:ext>
                 </a:extLst>
               </a:tr>
@@ -11378,7 +12295,7 @@
                 </a:tc>
                 <a:extLst>
                   <a:ext uri="{0D108BD9-81ED-4DB2-BD59-A6C34878D82A}">
-                    <a16:rowId xmlns="" xmlns:a16="http://schemas.microsoft.com/office/drawing/2014/main" val="10003"/>
+                    <a16:rowId xmlns:a16="http://schemas.microsoft.com/office/drawing/2014/main" xmlns="" val="10003"/>
                   </a:ext>
                 </a:extLst>
               </a:tr>
@@ -11511,7 +12428,7 @@
                 </a:tc>
                 <a:extLst>
                   <a:ext uri="{0D108BD9-81ED-4DB2-BD59-A6C34878D82A}">
-                    <a16:rowId xmlns="" xmlns:a16="http://schemas.microsoft.com/office/drawing/2014/main" val="10004"/>
+                    <a16:rowId xmlns:a16="http://schemas.microsoft.com/office/drawing/2014/main" xmlns="" val="10004"/>
                   </a:ext>
                 </a:extLst>
               </a:tr>
@@ -11644,7 +12561,7 @@
                 </a:tc>
                 <a:extLst>
                   <a:ext uri="{0D108BD9-81ED-4DB2-BD59-A6C34878D82A}">
-                    <a16:rowId xmlns="" xmlns:a16="http://schemas.microsoft.com/office/drawing/2014/main" val="10005"/>
+                    <a16:rowId xmlns:a16="http://schemas.microsoft.com/office/drawing/2014/main" xmlns="" val="10005"/>
                   </a:ext>
                 </a:extLst>
               </a:tr>
@@ -11777,7 +12694,7 @@
                 </a:tc>
                 <a:extLst>
                   <a:ext uri="{0D108BD9-81ED-4DB2-BD59-A6C34878D82A}">
-                    <a16:rowId xmlns="" xmlns:a16="http://schemas.microsoft.com/office/drawing/2014/main" val="10006"/>
+                    <a16:rowId xmlns:a16="http://schemas.microsoft.com/office/drawing/2014/main" xmlns="" val="10006"/>
                   </a:ext>
                 </a:extLst>
               </a:tr>
@@ -11910,7 +12827,7 @@
                 </a:tc>
                 <a:extLst>
                   <a:ext uri="{0D108BD9-81ED-4DB2-BD59-A6C34878D82A}">
-                    <a16:rowId xmlns="" xmlns:a16="http://schemas.microsoft.com/office/drawing/2014/main" val="10007"/>
+                    <a16:rowId xmlns:a16="http://schemas.microsoft.com/office/drawing/2014/main" xmlns="" val="10007"/>
                   </a:ext>
                 </a:extLst>
               </a:tr>
@@ -12043,7 +12960,7 @@
                 </a:tc>
                 <a:extLst>
                   <a:ext uri="{0D108BD9-81ED-4DB2-BD59-A6C34878D82A}">
-                    <a16:rowId xmlns="" xmlns:a16="http://schemas.microsoft.com/office/drawing/2014/main" val="10008"/>
+                    <a16:rowId xmlns:a16="http://schemas.microsoft.com/office/drawing/2014/main" xmlns="" val="10008"/>
                   </a:ext>
                 </a:extLst>
               </a:tr>
@@ -12176,7 +13093,7 @@
                 </a:tc>
                 <a:extLst>
                   <a:ext uri="{0D108BD9-81ED-4DB2-BD59-A6C34878D82A}">
-                    <a16:rowId xmlns="" xmlns:a16="http://schemas.microsoft.com/office/drawing/2014/main" val="10009"/>
+                    <a16:rowId xmlns:a16="http://schemas.microsoft.com/office/drawing/2014/main" xmlns="" val="10009"/>
                   </a:ext>
                 </a:extLst>
               </a:tr>
@@ -12217,6 +13134,13 @@
   <p:clrMapOvr>
     <a:masterClrMapping/>
   </p:clrMapOvr>
+  <p:timing>
+    <p:tnLst>
+      <p:par>
+        <p:cTn xmlns:p14="http://schemas.microsoft.com/office/powerpoint/2010/main" id="1" dur="indefinite" restart="never" nodeType="tmRoot"/>
+      </p:par>
+    </p:tnLst>
+  </p:timing>
 </p:sld>
 </file>
 
@@ -12950,6 +13874,13 @@
   <p:clrMapOvr>
     <a:masterClrMapping/>
   </p:clrMapOvr>
+  <p:timing>
+    <p:tnLst>
+      <p:par>
+        <p:cTn xmlns:p14="http://schemas.microsoft.com/office/powerpoint/2010/main" id="1" dur="indefinite" restart="never" nodeType="tmRoot"/>
+      </p:par>
+    </p:tnLst>
+  </p:timing>
 </p:sld>
 </file>
 
@@ -13121,7 +14052,7 @@
           <p:cNvPr id="2" name="Imagen 1">
             <a:extLst>
               <a:ext uri="{FF2B5EF4-FFF2-40B4-BE49-F238E27FC236}">
-                <a16:creationId xmlns="" xmlns:a16="http://schemas.microsoft.com/office/drawing/2014/main" id="{E3336E14-CC39-B545-BA7E-A847B341F66B}"/>
+                <a16:creationId xmlns:a16="http://schemas.microsoft.com/office/drawing/2014/main" xmlns="" id="{E3336E14-CC39-B545-BA7E-A847B341F66B}"/>
               </a:ext>
             </a:extLst>
           </p:cNvPr>
@@ -13156,6 +14087,13 @@
   <p:clrMapOvr>
     <a:masterClrMapping/>
   </p:clrMapOvr>
+  <p:timing>
+    <p:tnLst>
+      <p:par>
+        <p:cTn xmlns:p14="http://schemas.microsoft.com/office/powerpoint/2010/main" id="1" dur="indefinite" restart="never" nodeType="tmRoot"/>
+      </p:par>
+    </p:tnLst>
+  </p:timing>
 </p:sld>
 </file>
 
@@ -13188,7 +14126,7 @@
         </p:nvSpPr>
         <p:spPr>
           <a:xfrm>
-            <a:off x="642050" y="4600153"/>
+            <a:off x="3597923" y="4600153"/>
             <a:ext cx="5308200" cy="543347"/>
           </a:xfrm>
         </p:spPr>
@@ -13307,6 +14245,13 @@
   <p:clrMapOvr>
     <a:masterClrMapping/>
   </p:clrMapOvr>
+  <p:timing>
+    <p:tnLst>
+      <p:par>
+        <p:cTn xmlns:p14="http://schemas.microsoft.com/office/powerpoint/2010/main" id="1" dur="indefinite" restart="never" nodeType="tmRoot"/>
+      </p:par>
+    </p:tnLst>
+  </p:timing>
 </p:sld>
 </file>
 
@@ -13484,6 +14429,13 @@
   <p:clrMapOvr>
     <a:masterClrMapping/>
   </p:clrMapOvr>
+  <p:timing>
+    <p:tnLst>
+      <p:par>
+        <p:cTn xmlns:p14="http://schemas.microsoft.com/office/powerpoint/2010/main" id="1" dur="indefinite" restart="never" nodeType="tmRoot"/>
+      </p:par>
+    </p:tnLst>
+  </p:timing>
 </p:sld>
 </file>
 
@@ -13667,7 +14619,7 @@
           <p:nvPr/>
         </p:nvPicPr>
         <p:blipFill>
-          <a:blip r:embed="rId2">
+          <a:blip r:embed="rId3">
             <a:extLst>
               <a:ext uri="{28A0092B-C50C-407E-A947-70E740481C1C}">
                 <a14:useLocalDpi xmlns:a14="http://schemas.microsoft.com/office/drawing/2010/main" val="0"/>
@@ -13697,7 +14649,7 @@
           <p:nvPr/>
         </p:nvPicPr>
         <p:blipFill>
-          <a:blip r:embed="rId3">
+          <a:blip r:embed="rId4">
             <a:extLst>
               <a:ext uri="{28A0092B-C50C-407E-A947-70E740481C1C}">
                 <a14:useLocalDpi xmlns:a14="http://schemas.microsoft.com/office/drawing/2010/main" val="0"/>
@@ -13727,7 +14679,7 @@
           <p:nvPr/>
         </p:nvPicPr>
         <p:blipFill>
-          <a:blip r:embed="rId4"/>
+          <a:blip r:embed="rId5"/>
           <a:stretch>
             <a:fillRect/>
           </a:stretch>
@@ -13751,7 +14703,7 @@
           <p:nvPr/>
         </p:nvPicPr>
         <p:blipFill>
-          <a:blip r:embed="rId5">
+          <a:blip r:embed="rId6">
             <a:extLst>
               <a:ext uri="{28A0092B-C50C-407E-A947-70E740481C1C}">
                 <a14:useLocalDpi xmlns:a14="http://schemas.microsoft.com/office/drawing/2010/main" val="0"/>
@@ -13781,7 +14733,7 @@
           <p:nvPr/>
         </p:nvPicPr>
         <p:blipFill>
-          <a:blip r:embed="rId6">
+          <a:blip r:embed="rId7">
             <a:extLst>
               <a:ext uri="{28A0092B-C50C-407E-A947-70E740481C1C}">
                 <a14:useLocalDpi xmlns:a14="http://schemas.microsoft.com/office/drawing/2010/main" val="0"/>
@@ -13811,7 +14763,7 @@
           <p:nvPr/>
         </p:nvPicPr>
         <p:blipFill>
-          <a:blip r:embed="rId7">
+          <a:blip r:embed="rId8">
             <a:extLst>
               <a:ext uri="{28A0092B-C50C-407E-A947-70E740481C1C}">
                 <a14:useLocalDpi xmlns:a14="http://schemas.microsoft.com/office/drawing/2010/main" val="0"/>
@@ -13841,7 +14793,7 @@
           <p:nvPr/>
         </p:nvPicPr>
         <p:blipFill>
-          <a:blip r:embed="rId2">
+          <a:blip r:embed="rId3">
             <a:extLst>
               <a:ext uri="{28A0092B-C50C-407E-A947-70E740481C1C}">
                 <a14:useLocalDpi xmlns:a14="http://schemas.microsoft.com/office/drawing/2010/main" val="0"/>
@@ -13871,7 +14823,7 @@
           <p:nvPr/>
         </p:nvPicPr>
         <p:blipFill>
-          <a:blip r:embed="rId3">
+          <a:blip r:embed="rId4">
             <a:extLst>
               <a:ext uri="{28A0092B-C50C-407E-A947-70E740481C1C}">
                 <a14:useLocalDpi xmlns:a14="http://schemas.microsoft.com/office/drawing/2010/main" val="0"/>
@@ -13901,7 +14853,7 @@
           <p:nvPr/>
         </p:nvPicPr>
         <p:blipFill>
-          <a:blip r:embed="rId8">
+          <a:blip r:embed="rId9">
             <a:extLst>
               <a:ext uri="{28A0092B-C50C-407E-A947-70E740481C1C}">
                 <a14:useLocalDpi xmlns:a14="http://schemas.microsoft.com/office/drawing/2010/main" val="0"/>
@@ -13931,7 +14883,7 @@
           <p:nvPr/>
         </p:nvPicPr>
         <p:blipFill>
-          <a:blip r:embed="rId9">
+          <a:blip r:embed="rId10">
             <a:extLst>
               <a:ext uri="{28A0092B-C50C-407E-A947-70E740481C1C}">
                 <a14:useLocalDpi xmlns:a14="http://schemas.microsoft.com/office/drawing/2010/main" val="0"/>
@@ -13961,7 +14913,7 @@
           <p:nvPr/>
         </p:nvPicPr>
         <p:blipFill>
-          <a:blip r:embed="rId10">
+          <a:blip r:embed="rId11">
             <a:extLst>
               <a:ext uri="{28A0092B-C50C-407E-A947-70E740481C1C}">
                 <a14:useLocalDpi xmlns:a14="http://schemas.microsoft.com/office/drawing/2010/main" val="0"/>
@@ -13991,7 +14943,7 @@
           <p:nvPr/>
         </p:nvPicPr>
         <p:blipFill>
-          <a:blip r:embed="rId11">
+          <a:blip r:embed="rId12">
             <a:extLst>
               <a:ext uri="{28A0092B-C50C-407E-A947-70E740481C1C}">
                 <a14:useLocalDpi xmlns:a14="http://schemas.microsoft.com/office/drawing/2010/main" val="0"/>
@@ -14022,6 +14974,13 @@
   <p:clrMapOvr>
     <a:masterClrMapping/>
   </p:clrMapOvr>
+  <p:timing>
+    <p:tnLst>
+      <p:par>
+        <p:cTn xmlns:p14="http://schemas.microsoft.com/office/powerpoint/2010/main" id="1" dur="indefinite" restart="never" nodeType="tmRoot"/>
+      </p:par>
+    </p:tnLst>
+  </p:timing>
 </p:sld>
 </file>
 
@@ -14644,7 +15603,7 @@
       </p:cxnSp>
       <p:sp>
         <p:nvSpPr>
-          <p:cNvPr id="11" name="Marcador de texto 1"/>
+          <p:cNvPr id="2" name="Marcador de texto 1"/>
           <p:cNvSpPr>
             <a:spLocks noGrp="1"/>
           </p:cNvSpPr>
@@ -14652,23 +15611,12 @@
             <p:ph type="body" idx="1"/>
           </p:nvPr>
         </p:nvSpPr>
-        <p:spPr>
-          <a:xfrm>
-            <a:off x="462444" y="4612980"/>
-            <a:ext cx="5308200" cy="543347"/>
-          </a:xfrm>
-        </p:spPr>
+        <p:spPr/>
         <p:txBody>
           <a:bodyPr/>
           <a:lstStyle/>
           <a:p>
-            <a:pPr marL="152400" indent="0">
-              <a:buNone/>
-            </a:pPr>
-            <a:r>
-              <a:rPr lang="es-ES" sz="1800" dirty="0"/>
-              <a:t>Hay 4 combinaciones posibles con dos bits</a:t>
-            </a:r>
+            <a:endParaRPr lang="es-ES"/>
           </a:p>
         </p:txBody>
       </p:sp>
@@ -14677,6 +15625,13 @@
   <p:clrMapOvr>
     <a:masterClrMapping/>
   </p:clrMapOvr>
+  <p:timing>
+    <p:tnLst>
+      <p:par>
+        <p:cTn xmlns:p14="http://schemas.microsoft.com/office/powerpoint/2010/main" id="1" dur="indefinite" restart="never" nodeType="tmRoot"/>
+      </p:par>
+    </p:tnLst>
+  </p:timing>
 </p:sld>
 </file>
 
@@ -14832,7 +15787,61 @@
                 <a:cs typeface="Roboto Condensed Light"/>
                 <a:sym typeface="Roboto Condensed Light"/>
               </a:rPr>
-              <a:t>sobre los bits del estado estas operaciones se realizan mediante </a:t>
+              <a:t>sobre los bits del </a:t>
+            </a:r>
+            <a:r>
+              <a:rPr lang="en" dirty="0" smtClean="0">
+                <a:latin typeface="Roboto Condensed Light"/>
+                <a:ea typeface="Roboto Condensed Light"/>
+                <a:cs typeface="Roboto Condensed Light"/>
+                <a:sym typeface="Roboto Condensed Light"/>
+              </a:rPr>
+              <a:t>estado</a:t>
+            </a:r>
+            <a:r>
+              <a:rPr lang="es-ES_tradnl" dirty="0" smtClean="0">
+                <a:latin typeface="Roboto Condensed Light"/>
+                <a:ea typeface="Roboto Condensed Light"/>
+                <a:cs typeface="Roboto Condensed Light"/>
+                <a:sym typeface="Roboto Condensed Light"/>
+              </a:rPr>
+              <a:t>.</a:t>
+            </a:r>
+            <a:r>
+              <a:rPr lang="en" dirty="0" smtClean="0">
+                <a:latin typeface="Roboto Condensed Light"/>
+                <a:ea typeface="Roboto Condensed Light"/>
+                <a:cs typeface="Roboto Condensed Light"/>
+                <a:sym typeface="Roboto Condensed Light"/>
+              </a:rPr>
+              <a:t> </a:t>
+            </a:r>
+            <a:r>
+              <a:rPr lang="es-ES_tradnl" dirty="0">
+                <a:latin typeface="Roboto Condensed Light"/>
+                <a:ea typeface="Roboto Condensed Light"/>
+                <a:cs typeface="Roboto Condensed Light"/>
+                <a:sym typeface="Roboto Condensed Light"/>
+              </a:rPr>
+              <a:t>E</a:t>
+            </a:r>
+            <a:r>
+              <a:rPr lang="en" dirty="0" smtClean="0">
+                <a:latin typeface="Roboto Condensed Light"/>
+                <a:ea typeface="Roboto Condensed Light"/>
+                <a:cs typeface="Roboto Condensed Light"/>
+                <a:sym typeface="Roboto Condensed Light"/>
+              </a:rPr>
+              <a:t>stas </a:t>
+            </a:r>
+            <a:r>
+              <a:rPr lang="en" dirty="0">
+                <a:latin typeface="Roboto Condensed Light"/>
+                <a:ea typeface="Roboto Condensed Light"/>
+                <a:cs typeface="Roboto Condensed Light"/>
+                <a:sym typeface="Roboto Condensed Light"/>
+              </a:rPr>
+              <a:t>operaciones se realizan mediante </a:t>
             </a:r>
             <a:r>
               <a:rPr lang="en" b="1" dirty="0">
@@ -14966,6 +15975,13 @@
   <p:clrMapOvr>
     <a:masterClrMapping/>
   </p:clrMapOvr>
+  <p:timing>
+    <p:tnLst>
+      <p:par>
+        <p:cTn xmlns:p14="http://schemas.microsoft.com/office/powerpoint/2010/main" id="1" dur="indefinite" restart="never" nodeType="tmRoot"/>
+      </p:par>
+    </p:tnLst>
+  </p:timing>
 </p:sld>
 </file>
 
@@ -15088,7 +16104,7 @@
           <p:nvPr/>
         </p:nvPicPr>
         <p:blipFill>
-          <a:blip r:embed="rId2">
+          <a:blip r:embed="rId3">
             <a:extLst>
               <a:ext uri="{28A0092B-C50C-407E-A947-70E740481C1C}">
                 <a14:useLocalDpi xmlns:a14="http://schemas.microsoft.com/office/drawing/2010/main" val="0"/>
@@ -15118,7 +16134,7 @@
           <p:nvPr/>
         </p:nvPicPr>
         <p:blipFill>
-          <a:blip r:embed="rId3"/>
+          <a:blip r:embed="rId4"/>
           <a:stretch>
             <a:fillRect/>
           </a:stretch>
@@ -15142,7 +16158,7 @@
         <p:spPr>
           <a:xfrm>
             <a:off x="412896" y="4771525"/>
-            <a:ext cx="6910704" cy="307777"/>
+            <a:ext cx="6960585" cy="523220"/>
           </a:xfrm>
           <a:prstGeom prst="rect">
             <a:avLst/>
@@ -15160,33 +16176,56 @@
               <a:t>Puertas cuánticas: </a:t>
             </a:r>
             <a:r>
-              <a:rPr lang="es-ES" dirty="0" err="1"/>
+              <a:rPr lang="es-ES" dirty="0" err="1">
+                <a:hlinkClick r:id="rId5"/>
+              </a:rPr>
               <a:t>https</a:t>
             </a:r>
             <a:r>
-              <a:rPr lang="es-ES" dirty="0"/>
+              <a:rPr lang="es-ES" dirty="0">
+                <a:hlinkClick r:id="rId5"/>
+              </a:rPr>
               <a:t>://quantum-</a:t>
             </a:r>
             <a:r>
-              <a:rPr lang="es-ES" dirty="0" err="1"/>
+              <a:rPr lang="es-ES" dirty="0" err="1">
+                <a:hlinkClick r:id="rId5"/>
+              </a:rPr>
               <a:t>computing.ibm.com</a:t>
             </a:r>
             <a:r>
-              <a:rPr lang="es-ES" dirty="0"/>
+              <a:rPr lang="es-ES" dirty="0">
+                <a:hlinkClick r:id="rId5"/>
+              </a:rPr>
               <a:t>/</a:t>
             </a:r>
             <a:r>
-              <a:rPr lang="es-ES" dirty="0" err="1"/>
+              <a:rPr lang="es-ES" dirty="0" err="1">
+                <a:hlinkClick r:id="rId5"/>
+              </a:rPr>
               <a:t>support</a:t>
             </a:r>
             <a:r>
-              <a:rPr lang="es-ES" dirty="0"/>
+              <a:rPr lang="es-ES" dirty="0">
+                <a:hlinkClick r:id="rId5"/>
+              </a:rPr>
               <a:t>/guides/</a:t>
             </a:r>
             <a:r>
-              <a:rPr lang="es-ES" dirty="0" err="1"/>
-              <a:t>gate-overview</a:t>
-            </a:r>
+              <a:rPr lang="es-ES" dirty="0" err="1">
+                <a:hlinkClick r:id="rId5"/>
+              </a:rPr>
+              <a:t>gate-</a:t>
+            </a:r>
+            <a:r>
+              <a:rPr lang="es-ES" dirty="0" err="1" smtClean="0">
+                <a:hlinkClick r:id="rId5"/>
+              </a:rPr>
+              <a:t>overview</a:t>
+            </a:r>
+            <a:endParaRPr lang="es-ES" dirty="0" smtClean="0"/>
+          </a:p>
+          <a:p>
             <a:endParaRPr lang="es-ES" dirty="0"/>
           </a:p>
         </p:txBody>
@@ -15201,6 +16240,13 @@
   <p:clrMapOvr>
     <a:masterClrMapping/>
   </p:clrMapOvr>
+  <p:timing>
+    <p:tnLst>
+      <p:par>
+        <p:cTn xmlns:p14="http://schemas.microsoft.com/office/powerpoint/2010/main" id="1" dur="indefinite" restart="never" nodeType="tmRoot"/>
+      </p:par>
+    </p:tnLst>
+  </p:timing>
 </p:sld>
 </file>
 
@@ -15364,6 +16410,13 @@
   <p:clrMapOvr>
     <a:masterClrMapping/>
   </p:clrMapOvr>
+  <p:timing>
+    <p:tnLst>
+      <p:par>
+        <p:cTn xmlns:p14="http://schemas.microsoft.com/office/powerpoint/2010/main" id="1" dur="indefinite" restart="never" nodeType="tmRoot"/>
+      </p:par>
+    </p:tnLst>
+  </p:timing>
 </p:sld>
 </file>
 

</xml_diff>